<commit_message>
Actualización de presentación final Línea Joven
</commit_message>
<xml_diff>
--- a/reports/Al rescate de la Línea Joven.pptx
+++ b/reports/Al rescate de la Línea Joven.pptx
@@ -7316,6 +7316,47 @@
                 </a:solidFill>
               </a:rPr>
               <a:t>Guillermo Tapia</a:t>
+            </a:r>
+          </a:p>
+        </p:txBody>
+      </p:sp>
+      <p:sp>
+        <p:nvSpPr>
+          <p:cNvPr id="4" name="TextBox 3">
+            <a:extLst>
+              <a:ext uri="{FF2B5EF4-FFF2-40B4-BE49-F238E27FC236}">
+                <a16:creationId xmlns:a16="http://schemas.microsoft.com/office/drawing/2014/main" id="{694E92E9-26DF-793C-9213-94CA485E8D25}"/>
+              </a:ext>
+            </a:extLst>
+          </p:cNvPr>
+          <p:cNvSpPr txBox="1"/>
+          <p:nvPr/>
+        </p:nvSpPr>
+        <p:spPr>
+          <a:xfrm>
+            <a:off x="6429935" y="1827911"/>
+            <a:ext cx="3951194" cy="369332"/>
+          </a:xfrm>
+          <a:prstGeom prst="rect">
+            <a:avLst/>
+          </a:prstGeom>
+          <a:noFill/>
+        </p:spPr>
+        <p:txBody>
+          <a:bodyPr wrap="square">
+            <a:spAutoFit/>
+          </a:bodyPr>
+          <a:lstStyle/>
+          <a:p>
+            <a:r>
+              <a:rPr lang="es-EC" dirty="0">
+                <a:hlinkClick r:id="rId3"/>
+              </a:rPr>
+              <a:t>https://github.com/Guillo-bit/Beletza</a:t>
+            </a:r>
+            <a:r>
+              <a:rPr lang="es-EC" dirty="0"/>
+              <a:t> </a:t>
             </a:r>
           </a:p>
         </p:txBody>
@@ -12779,23 +12820,12 @@
 </file>
 
 <file path=customXml/item1.xml><?xml version="1.0" encoding="utf-8"?>
-<p:properties xmlns:p="http://schemas.microsoft.com/office/2006/metadata/properties" xmlns:xsi="http://www.w3.org/2001/XMLSchema-instance" xmlns:pc="http://schemas.microsoft.com/office/infopath/2007/PartnerControls">
-  <documentManagement>
-    <_ip_UnifiedCompliancePolicyUIAction xmlns="http://schemas.microsoft.com/sharepoint/v3" xsi:nil="true"/>
-    <Image xmlns="71af3243-3dd4-4a8d-8c0d-dd76da1f02a5">
-      <Url xsi:nil="true"/>
-      <Description xsi:nil="true"/>
-    </Image>
-    <Status xmlns="71af3243-3dd4-4a8d-8c0d-dd76da1f02a5">Not started</Status>
-    <Background xmlns="71af3243-3dd4-4a8d-8c0d-dd76da1f02a5">false</Background>
-    <_ip_UnifiedCompliancePolicyProperties xmlns="http://schemas.microsoft.com/sharepoint/v3" xsi:nil="true"/>
-    <ImageTagsTaxHTField xmlns="71af3243-3dd4-4a8d-8c0d-dd76da1f02a5">
-      <Terms xmlns="http://schemas.microsoft.com/office/infopath/2007/PartnerControls"/>
-    </ImageTagsTaxHTField>
-    <TaxCatchAll xmlns="230e9df3-be65-4c73-a93b-d1236ebd677e" xsi:nil="true"/>
-    <MediaServiceKeyPoints xmlns="71af3243-3dd4-4a8d-8c0d-dd76da1f02a5" xsi:nil="true"/>
-  </documentManagement>
-</p:properties>
+<?mso-contentType ?>
+<FormTemplates xmlns="http://schemas.microsoft.com/sharepoint/v3/contenttype/forms">
+  <Display>DocumentLibraryForm</Display>
+  <Edit>DocumentLibraryForm</Edit>
+  <New>DocumentLibraryForm</New>
+</FormTemplates>
 </file>
 
 <file path=customXml/item2.xml><?xml version="1.0" encoding="utf-8"?>
@@ -13111,22 +13141,29 @@
 </file>
 
 <file path=customXml/item3.xml><?xml version="1.0" encoding="utf-8"?>
-<?mso-contentType ?>
-<FormTemplates xmlns="http://schemas.microsoft.com/sharepoint/v3/contenttype/forms">
-  <Display>DocumentLibraryForm</Display>
-  <Edit>DocumentLibraryForm</Edit>
-  <New>DocumentLibraryForm</New>
-</FormTemplates>
+<p:properties xmlns:p="http://schemas.microsoft.com/office/2006/metadata/properties" xmlns:xsi="http://www.w3.org/2001/XMLSchema-instance" xmlns:pc="http://schemas.microsoft.com/office/infopath/2007/PartnerControls">
+  <documentManagement>
+    <_ip_UnifiedCompliancePolicyUIAction xmlns="http://schemas.microsoft.com/sharepoint/v3" xsi:nil="true"/>
+    <Image xmlns="71af3243-3dd4-4a8d-8c0d-dd76da1f02a5">
+      <Url xsi:nil="true"/>
+      <Description xsi:nil="true"/>
+    </Image>
+    <Status xmlns="71af3243-3dd4-4a8d-8c0d-dd76da1f02a5">Not started</Status>
+    <Background xmlns="71af3243-3dd4-4a8d-8c0d-dd76da1f02a5">false</Background>
+    <_ip_UnifiedCompliancePolicyProperties xmlns="http://schemas.microsoft.com/sharepoint/v3" xsi:nil="true"/>
+    <ImageTagsTaxHTField xmlns="71af3243-3dd4-4a8d-8c0d-dd76da1f02a5">
+      <Terms xmlns="http://schemas.microsoft.com/office/infopath/2007/PartnerControls"/>
+    </ImageTagsTaxHTField>
+    <TaxCatchAll xmlns="230e9df3-be65-4c73-a93b-d1236ebd677e" xsi:nil="true"/>
+    <MediaServiceKeyPoints xmlns="71af3243-3dd4-4a8d-8c0d-dd76da1f02a5" xsi:nil="true"/>
+  </documentManagement>
+</p:properties>
 </file>
 
 <file path=customXml/itemProps1.xml><?xml version="1.0" encoding="utf-8"?>
-<ds:datastoreItem xmlns:ds="http://schemas.openxmlformats.org/officeDocument/2006/customXml" ds:itemID="{AB045227-5724-4DBF-9712-031B1BFB2C3C}">
+<ds:datastoreItem xmlns:ds="http://schemas.openxmlformats.org/officeDocument/2006/customXml" ds:itemID="{B7B39BD0-040C-43BE-B0E4-512B09E8003F}">
   <ds:schemaRefs>
-    <ds:schemaRef ds:uri="http://schemas.microsoft.com/office/2006/metadata/properties"/>
-    <ds:schemaRef ds:uri="http://schemas.microsoft.com/office/infopath/2007/PartnerControls"/>
-    <ds:schemaRef ds:uri="http://schemas.microsoft.com/sharepoint/v3"/>
-    <ds:schemaRef ds:uri="71af3243-3dd4-4a8d-8c0d-dd76da1f02a5"/>
-    <ds:schemaRef ds:uri="230e9df3-be65-4c73-a93b-d1236ebd677e"/>
+    <ds:schemaRef ds:uri="http://schemas.microsoft.com/sharepoint/v3/contenttype/forms"/>
   </ds:schemaRefs>
 </ds:datastoreItem>
 </file>
@@ -13153,9 +13190,13 @@
 </file>
 
 <file path=customXml/itemProps3.xml><?xml version="1.0" encoding="utf-8"?>
-<ds:datastoreItem xmlns:ds="http://schemas.openxmlformats.org/officeDocument/2006/customXml" ds:itemID="{B7B39BD0-040C-43BE-B0E4-512B09E8003F}">
+<ds:datastoreItem xmlns:ds="http://schemas.openxmlformats.org/officeDocument/2006/customXml" ds:itemID="{AB045227-5724-4DBF-9712-031B1BFB2C3C}">
   <ds:schemaRefs>
-    <ds:schemaRef ds:uri="http://schemas.microsoft.com/sharepoint/v3/contenttype/forms"/>
+    <ds:schemaRef ds:uri="http://schemas.microsoft.com/office/2006/metadata/properties"/>
+    <ds:schemaRef ds:uri="http://schemas.microsoft.com/office/infopath/2007/PartnerControls"/>
+    <ds:schemaRef ds:uri="http://schemas.microsoft.com/sharepoint/v3"/>
+    <ds:schemaRef ds:uri="71af3243-3dd4-4a8d-8c0d-dd76da1f02a5"/>
+    <ds:schemaRef ds:uri="230e9df3-be65-4c73-a93b-d1236ebd677e"/>
   </ds:schemaRefs>
 </ds:datastoreItem>
 </file>

</xml_diff>